<commit_message>
Added slides to bombster.pptx
</commit_message>
<xml_diff>
--- a/Bombster.pptx
+++ b/Bombster.pptx
@@ -13,7 +13,9 @@
     <p:sldId id="260" r:id="rId7"/>
     <p:sldId id="261" r:id="rId8"/>
     <p:sldId id="262" r:id="rId9"/>
-    <p:sldId id="264" r:id="rId10"/>
+    <p:sldId id="265" r:id="rId10"/>
+    <p:sldId id="266" r:id="rId11"/>
+    <p:sldId id="264" r:id="rId12"/>
   </p:sldIdLst>
   <p:sldSz cx="9144000" cy="6858000" type="screen4x3"/>
   <p:notesSz cx="6858000" cy="9144000"/>
@@ -3238,6 +3240,216 @@
 </p:sld>
 </file>
 
+<file path=ppt/slides/slide10.xml><?xml version="1.0" encoding="utf-8"?>
+<p:sld xmlns:a="http://schemas.openxmlformats.org/drawingml/2006/main" xmlns:r="http://schemas.openxmlformats.org/officeDocument/2006/relationships" xmlns:p="http://schemas.openxmlformats.org/presentationml/2006/main">
+  <p:cSld>
+    <p:spTree>
+      <p:nvGrpSpPr>
+        <p:cNvPr id="1" name=""/>
+        <p:cNvGrpSpPr/>
+        <p:nvPr/>
+      </p:nvGrpSpPr>
+      <p:grpSpPr>
+        <a:xfrm>
+          <a:off x="0" y="0"/>
+          <a:ext cx="0" cy="0"/>
+          <a:chOff x="0" y="0"/>
+          <a:chExt cx="0" cy="0"/>
+        </a:xfrm>
+      </p:grpSpPr>
+      <p:sp>
+        <p:nvSpPr>
+          <p:cNvPr id="2" name="Shape 1"/>
+          <p:cNvSpPr>
+            <a:spLocks noGrp="1"/>
+          </p:cNvSpPr>
+          <p:nvPr>
+            <p:ph type="title"/>
+          </p:nvPr>
+        </p:nvSpPr>
+        <p:spPr>
+          <a:xfrm>
+            <a:off x="1046756" y="73472"/>
+            <a:ext cx="7315199" cy="1154097"/>
+          </a:xfrm>
+        </p:spPr>
+        <p:txBody>
+          <a:bodyPr/>
+          <a:lstStyle/>
+          <a:p>
+            <a:r>
+              <a:rPr lang="en-US" dirty="0"/>
+              <a:t>Questions / Suggestions</a:t>
+            </a:r>
+          </a:p>
+        </p:txBody>
+      </p:sp>
+      <p:sp>
+        <p:nvSpPr>
+          <p:cNvPr id="6148" name="TextBox 6148"/>
+          <p:cNvSpPr txBox="1"/>
+          <p:nvPr/>
+        </p:nvSpPr>
+        <p:spPr>
+          <a:xfrm>
+            <a:off x="3683000" y="1726729"/>
+            <a:ext cx="2112374" cy="3939540"/>
+          </a:xfrm>
+          <a:prstGeom prst="rect">
+            <a:avLst/>
+          </a:prstGeom>
+          <a:noFill/>
+        </p:spPr>
+        <p:txBody>
+          <a:bodyPr anchor="ctr">
+            <a:spAutoFit/>
+          </a:bodyPr>
+          <a:lstStyle/>
+          <a:p>
+            <a:pPr algn="ctr"/>
+            <a:r>
+              <a:rPr sz="25000" b="1" dirty="0">
+                <a:solidFill>
+                  <a:srgbClr val="FF7F00"/>
+                </a:solidFill>
+                <a:latin typeface="Arimo"/>
+              </a:rPr>
+              <a:t>?</a:t>
+            </a:r>
+            <a:endParaRPr sz="25000" dirty="0">
+              <a:latin typeface="Arimo"/>
+            </a:endParaRPr>
+          </a:p>
+        </p:txBody>
+      </p:sp>
+    </p:spTree>
+  </p:cSld>
+  <p:clrMapOvr>
+    <a:masterClrMapping/>
+  </p:clrMapOvr>
+</p:sld>
+</file>
+
+<file path=ppt/slides/slide11.xml><?xml version="1.0" encoding="utf-8"?>
+<p:sld xmlns:a="http://schemas.openxmlformats.org/drawingml/2006/main" xmlns:r="http://schemas.openxmlformats.org/officeDocument/2006/relationships" xmlns:p="http://schemas.openxmlformats.org/presentationml/2006/main">
+  <p:cSld>
+    <p:spTree>
+      <p:nvGrpSpPr>
+        <p:cNvPr id="1" name=""/>
+        <p:cNvGrpSpPr/>
+        <p:nvPr/>
+      </p:nvGrpSpPr>
+      <p:grpSpPr>
+        <a:xfrm>
+          <a:off x="0" y="0"/>
+          <a:ext cx="0" cy="0"/>
+          <a:chOff x="0" y="0"/>
+          <a:chExt cx="0" cy="0"/>
+        </a:xfrm>
+      </p:grpSpPr>
+      <p:sp>
+        <p:nvSpPr>
+          <p:cNvPr id="2" name="Title 1"/>
+          <p:cNvSpPr>
+            <a:spLocks noGrp="1"/>
+          </p:cNvSpPr>
+          <p:nvPr>
+            <p:ph type="title"/>
+          </p:nvPr>
+        </p:nvSpPr>
+        <p:spPr>
+          <a:xfrm>
+            <a:off x="838200" y="152400"/>
+            <a:ext cx="7315200" cy="1154097"/>
+          </a:xfrm>
+        </p:spPr>
+        <p:txBody>
+          <a:bodyPr/>
+          <a:lstStyle/>
+          <a:p>
+            <a:pPr algn="ctr"/>
+            <a:r>
+              <a:rPr lang="en-US" dirty="0" smtClean="0"/>
+              <a:t>The End</a:t>
+            </a:r>
+            <a:endParaRPr lang="en-US" dirty="0"/>
+          </a:p>
+        </p:txBody>
+      </p:sp>
+      <p:pic>
+        <p:nvPicPr>
+          <p:cNvPr id="6146" name="Picture 2"/>
+          <p:cNvPicPr>
+            <a:picLocks noChangeAspect="1" noChangeArrowheads="1"/>
+          </p:cNvPicPr>
+          <p:nvPr/>
+        </p:nvPicPr>
+        <p:blipFill>
+          <a:blip r:embed="rId2">
+            <a:extLst>
+              <a:ext uri="{28A0092B-C50C-407E-A947-70E740481C1C}">
+                <a14:useLocalDpi xmlns:a14="http://schemas.microsoft.com/office/drawing/2010/main" val="0"/>
+              </a:ext>
+            </a:extLst>
+          </a:blip>
+          <a:srcRect/>
+          <a:stretch>
+            <a:fillRect/>
+          </a:stretch>
+        </p:blipFill>
+        <p:spPr bwMode="auto">
+          <a:xfrm>
+            <a:off x="2819400" y="2438400"/>
+            <a:ext cx="3352800" cy="2247900"/>
+          </a:xfrm>
+          <a:prstGeom prst="rect">
+            <a:avLst/>
+          </a:prstGeom>
+          <a:noFill/>
+          <a:ln>
+            <a:noFill/>
+          </a:ln>
+          <a:extLst>
+            <a:ext uri="{909E8E84-426E-40DD-AFC4-6F175D3DCCD1}">
+              <a14:hiddenFill xmlns:a14="http://schemas.microsoft.com/office/drawing/2010/main">
+                <a:solidFill>
+                  <a:schemeClr val="accent1"/>
+                </a:solidFill>
+              </a14:hiddenFill>
+            </a:ext>
+            <a:ext uri="{91240B29-F687-4F45-9708-019B960494DF}">
+              <a14:hiddenLine xmlns:a14="http://schemas.microsoft.com/office/drawing/2010/main" w="9525">
+                <a:solidFill>
+                  <a:schemeClr val="tx1"/>
+                </a:solidFill>
+                <a:miter lim="800000"/>
+                <a:headEnd/>
+                <a:tailEnd/>
+              </a14:hiddenLine>
+            </a:ext>
+          </a:extLst>
+        </p:spPr>
+      </p:pic>
+    </p:spTree>
+    <p:extLst>
+      <p:ext uri="{BB962C8B-B14F-4D97-AF65-F5344CB8AC3E}">
+        <p14:creationId xmlns:p14="http://schemas.microsoft.com/office/powerpoint/2010/main" val="3228610340"/>
+      </p:ext>
+    </p:extLst>
+  </p:cSld>
+  <p:clrMapOvr>
+    <a:masterClrMapping/>
+  </p:clrMapOvr>
+  <p:timing>
+    <p:tnLst>
+      <p:par>
+        <p:cTn id="1" dur="indefinite" restart="never" nodeType="tmRoot"/>
+      </p:par>
+    </p:tnLst>
+  </p:timing>
+</p:sld>
+</file>
+
 <file path=ppt/slides/slide2.xml><?xml version="1.0" encoding="utf-8"?>
 <p:sld xmlns:a="http://schemas.openxmlformats.org/drawingml/2006/main" xmlns:r="http://schemas.openxmlformats.org/officeDocument/2006/relationships" xmlns:p="http://schemas.openxmlformats.org/presentationml/2006/main">
   <p:cSld>
@@ -3279,28 +3491,6 @@
               <a:rPr lang="en-US" dirty="0" smtClean="0"/>
               <a:t>Inspiration</a:t>
             </a:r>
-            <a:endParaRPr lang="en-US" dirty="0"/>
-          </a:p>
-        </p:txBody>
-      </p:sp>
-      <p:sp>
-        <p:nvSpPr>
-          <p:cNvPr id="3" name="Content Placeholder 2"/>
-          <p:cNvSpPr>
-            <a:spLocks noGrp="1"/>
-          </p:cNvSpPr>
-          <p:nvPr>
-            <p:ph idx="1"/>
-          </p:nvPr>
-        </p:nvSpPr>
-        <p:spPr/>
-        <p:txBody>
-          <a:bodyPr/>
-          <a:lstStyle/>
-          <a:p>
-            <a:pPr marL="0" indent="0">
-              <a:buNone/>
-            </a:pPr>
             <a:endParaRPr lang="en-US" dirty="0"/>
           </a:p>
         </p:txBody>
@@ -3543,25 +3733,6 @@
           </a:p>
         </p:txBody>
       </p:sp>
-      <p:sp>
-        <p:nvSpPr>
-          <p:cNvPr id="3" name="Content Placeholder 2"/>
-          <p:cNvSpPr>
-            <a:spLocks noGrp="1"/>
-          </p:cNvSpPr>
-          <p:nvPr>
-            <p:ph idx="1"/>
-          </p:nvPr>
-        </p:nvSpPr>
-        <p:spPr/>
-        <p:txBody>
-          <a:bodyPr/>
-          <a:lstStyle/>
-          <a:p>
-            <a:endParaRPr lang="en-US" dirty="0"/>
-          </a:p>
-        </p:txBody>
-      </p:sp>
       <p:pic>
         <p:nvPicPr>
           <p:cNvPr id="1026" name="Picture 2"/>
@@ -3585,7 +3756,7 @@
         </p:blipFill>
         <p:spPr bwMode="auto">
           <a:xfrm>
-            <a:off x="1143000" y="1295400"/>
+            <a:off x="1219200" y="1219200"/>
             <a:ext cx="6919630" cy="5410200"/>
           </a:xfrm>
           <a:prstGeom prst="rect">
@@ -4522,7 +4693,7 @@
       </p:grpSpPr>
       <p:sp>
         <p:nvSpPr>
-          <p:cNvPr id="2" name="Title 1"/>
+          <p:cNvPr id="2" name="Shape 1"/>
           <p:cNvSpPr>
             <a:spLocks noGrp="1"/>
           </p:cNvSpPr>
@@ -4532,52 +4703,104 @@
         </p:nvSpPr>
         <p:spPr>
           <a:xfrm>
-            <a:off x="838200" y="152400"/>
-            <a:ext cx="7315200" cy="1154097"/>
+            <a:off x="1025236" y="113596"/>
+            <a:ext cx="7315201" cy="1154097"/>
           </a:xfrm>
         </p:spPr>
         <p:txBody>
           <a:bodyPr/>
           <a:lstStyle/>
           <a:p>
-            <a:pPr algn="ctr"/>
-            <a:r>
-              <a:rPr lang="en-US" dirty="0" smtClean="0"/>
-              <a:t>The End</a:t>
-            </a:r>
-            <a:endParaRPr lang="en-US" dirty="0"/>
-          </a:p>
-        </p:txBody>
-      </p:sp>
-      <p:sp>
-        <p:nvSpPr>
-          <p:cNvPr id="3" name="Content Placeholder 2"/>
-          <p:cNvSpPr>
-            <a:spLocks noGrp="1"/>
-          </p:cNvSpPr>
-          <p:nvPr>
-            <p:ph idx="1"/>
-          </p:nvPr>
-        </p:nvSpPr>
-        <p:spPr/>
-        <p:txBody>
-          <a:bodyPr/>
-          <a:lstStyle/>
-          <a:p>
+            <a:r>
+              <a:rPr lang="en-US" dirty="0"/>
+              <a:t>What Works and What Doesn't</a:t>
+            </a:r>
+          </a:p>
+        </p:txBody>
+      </p:sp>
+      <p:sp>
+        <p:nvSpPr>
+          <p:cNvPr id="3" name="Shape 2"/>
+          <p:cNvSpPr>
+            <a:spLocks noGrp="1"/>
+          </p:cNvSpPr>
+          <p:nvPr>
+            <p:ph type="body" idx="1"/>
+          </p:nvPr>
+        </p:nvSpPr>
+        <p:spPr>
+          <a:xfrm rot="1884">
+            <a:off x="915382" y="1829853"/>
+            <a:ext cx="3846076" cy="3586339"/>
+          </a:xfrm>
+        </p:spPr>
+        <p:txBody>
+          <a:bodyPr/>
+          <a:lstStyle/>
+          <a:p>
+            <a:r>
+              <a:rPr lang="en-US" dirty="0"/>
+              <a:t>Working</a:t>
+            </a:r>
+          </a:p>
+          <a:p>
+            <a:pPr lvl="1"/>
+            <a:r>
+              <a:rPr lang="en-US" dirty="0"/>
+              <a:t>Graphics</a:t>
+            </a:r>
+          </a:p>
+          <a:p>
+            <a:pPr lvl="1"/>
+            <a:r>
+              <a:rPr lang="en-US" dirty="0"/>
+              <a:t>Controls</a:t>
+            </a:r>
+          </a:p>
+          <a:p>
+            <a:pPr lvl="1"/>
+            <a:r>
+              <a:rPr lang="en-US" dirty="0"/>
+              <a:t>Movement</a:t>
+            </a:r>
+          </a:p>
+          <a:p>
+            <a:pPr lvl="0"/>
+            <a:r>
+              <a:rPr lang="en-US" dirty="0"/>
+              <a:t>Not Working</a:t>
+            </a:r>
+          </a:p>
+          <a:p>
+            <a:pPr lvl="1"/>
+            <a:r>
+              <a:rPr lang="en-US" dirty="0"/>
+              <a:t>Music</a:t>
+            </a:r>
+          </a:p>
+          <a:p>
+            <a:pPr lvl="1"/>
+            <a:r>
+              <a:rPr lang="en-US" dirty="0"/>
+              <a:t>Collision Detection</a:t>
+            </a:r>
+          </a:p>
+          <a:p>
+            <a:pPr lvl="1"/>
             <a:endParaRPr lang="en-US" dirty="0"/>
           </a:p>
         </p:txBody>
       </p:sp>
       <p:pic>
         <p:nvPicPr>
-          <p:cNvPr id="6146" name="Picture 2"/>
+          <p:cNvPr id="1026" name="Picture 2" descr="C:\Users\Piotr\AppData\Local\Microsoft\Windows\Temporary Internet Files\Content.IE5\UK2ON8GO\MC900078627[1].wmf"/>
           <p:cNvPicPr>
             <a:picLocks noChangeAspect="1" noChangeArrowheads="1"/>
           </p:cNvPicPr>
           <p:nvPr/>
         </p:nvPicPr>
         <p:blipFill>
-          <a:blip r:embed="rId2">
+          <a:blip r:embed="rId2" cstate="print">
             <a:extLst>
               <a:ext uri="{28A0092B-C50C-407E-A947-70E740481C1C}">
                 <a14:useLocalDpi xmlns:a14="http://schemas.microsoft.com/office/drawing/2010/main" val="0"/>
@@ -4591,54 +4814,29 @@
         </p:blipFill>
         <p:spPr bwMode="auto">
           <a:xfrm>
-            <a:off x="2819400" y="2438400"/>
-            <a:ext cx="3352800" cy="2247900"/>
+            <a:off x="4643250" y="1905000"/>
+            <a:ext cx="4016999" cy="3945437"/>
           </a:xfrm>
           <a:prstGeom prst="rect">
             <a:avLst/>
           </a:prstGeom>
           <a:noFill/>
-          <a:ln>
-            <a:noFill/>
-          </a:ln>
           <a:extLst>
             <a:ext uri="{909E8E84-426E-40DD-AFC4-6F175D3DCCD1}">
               <a14:hiddenFill xmlns:a14="http://schemas.microsoft.com/office/drawing/2010/main">
                 <a:solidFill>
-                  <a:schemeClr val="accent1"/>
+                  <a:srgbClr val="FFFFFF"/>
                 </a:solidFill>
               </a14:hiddenFill>
-            </a:ext>
-            <a:ext uri="{91240B29-F687-4F45-9708-019B960494DF}">
-              <a14:hiddenLine xmlns:a14="http://schemas.microsoft.com/office/drawing/2010/main" w="9525">
-                <a:solidFill>
-                  <a:schemeClr val="tx1"/>
-                </a:solidFill>
-                <a:miter lim="800000"/>
-                <a:headEnd/>
-                <a:tailEnd/>
-              </a14:hiddenLine>
             </a:ext>
           </a:extLst>
         </p:spPr>
       </p:pic>
     </p:spTree>
-    <p:extLst>
-      <p:ext uri="{BB962C8B-B14F-4D97-AF65-F5344CB8AC3E}">
-        <p14:creationId xmlns:p14="http://schemas.microsoft.com/office/powerpoint/2010/main" val="3228610340"/>
-      </p:ext>
-    </p:extLst>
   </p:cSld>
   <p:clrMapOvr>
     <a:masterClrMapping/>
   </p:clrMapOvr>
-  <p:timing>
-    <p:tnLst>
-      <p:par>
-        <p:cTn id="1" dur="indefinite" restart="never" nodeType="tmRoot"/>
-      </p:par>
-    </p:tnLst>
-  </p:timing>
 </p:sld>
 </file>
 

</xml_diff>